<commit_message>
Ergebnisse CI Mitarbeiter eingetragen und in PDF umgewandelt
</commit_message>
<xml_diff>
--- a/praesentationen/Zwischenpräsentation_Relaunch_RZ_28.7.15.pptx
+++ b/praesentationen/Zwischenpräsentation_Relaunch_RZ_28.7.15.pptx
@@ -233,7 +233,7 @@
             <a:fld id="{350B7780-B50B-474C-85C6-0B4009B6F014}" type="datetimeFigureOut">
               <a:rPr lang="de-DE" smtClean="0"/>
               <a:pPr/>
-              <a:t>27.07.15</a:t>
+              <a:t>27.07.2015</a:t>
             </a:fld>
             <a:endParaRPr lang="de-DE"/>
           </a:p>
@@ -405,7 +405,7 @@
             <a:fld id="{19FFB102-D3AF-431C-A902-ADE5B2A48608}" type="datetimeFigureOut">
               <a:rPr lang="de-DE" smtClean="0"/>
               <a:pPr/>
-              <a:t>27.07.15</a:t>
+              <a:t>27.07.2015</a:t>
             </a:fld>
             <a:endParaRPr lang="de-DE"/>
           </a:p>
@@ -3841,11 +3841,7 @@
             </a:r>
             <a:r>
               <a:rPr lang="de-DE" dirty="0" smtClean="0"/>
-              <a:t> </a:t>
-            </a:r>
-            <a:r>
-              <a:rPr lang="de-DE" dirty="0" smtClean="0"/>
-              <a:t>(Studenten) </a:t>
+              <a:t> (Studenten) </a:t>
             </a:r>
             <a:endParaRPr lang="de-DE" dirty="0"/>
           </a:p>
@@ -3893,7 +3889,6 @@
               <a:rPr lang="de-DE" dirty="0" smtClean="0"/>
               <a:t>Durchführung in allen Cafeterien der Universität Regensburg </a:t>
             </a:r>
-            <a:endParaRPr lang="de-DE" dirty="0" smtClean="0"/>
           </a:p>
           <a:p>
             <a:pPr marL="1028700" lvl="1">
@@ -3904,7 +3899,6 @@
               <a:rPr lang="de-DE" dirty="0" smtClean="0"/>
               <a:t>Abschließendes Interview </a:t>
             </a:r>
-            <a:endParaRPr lang="de-DE" dirty="0" smtClean="0"/>
           </a:p>
           <a:p>
             <a:pPr marL="1028700" lvl="1">
@@ -4138,11 +4132,15 @@
             </a:pPr>
             <a:r>
               <a:rPr lang="de-DE" dirty="0"/>
-              <a:t>6</a:t>
+              <a:t>5</a:t>
             </a:r>
             <a:r>
               <a:rPr lang="de-DE" dirty="0" smtClean="0"/>
-              <a:t> Teilnehmer</a:t>
+              <a:t> </a:t>
+            </a:r>
+            <a:r>
+              <a:rPr lang="de-DE" dirty="0" smtClean="0"/>
+              <a:t>Teilnehmer</a:t>
             </a:r>
           </a:p>
           <a:p>
@@ -4162,9 +4160,12 @@
             </a:pPr>
             <a:r>
               <a:rPr lang="de-DE" dirty="0" smtClean="0"/>
-              <a:t>Durchschnittsalter Jahre </a:t>
-            </a:r>
-            <a:endParaRPr lang="de-DE" dirty="0" smtClean="0"/>
+              <a:t>Abschließendes </a:t>
+            </a:r>
+            <a:r>
+              <a:rPr lang="de-DE" dirty="0" smtClean="0"/>
+              <a:t>Interview </a:t>
+            </a:r>
           </a:p>
           <a:p>
             <a:pPr marL="1028700" lvl="1">
@@ -4173,69 +4174,30 @@
             </a:pPr>
             <a:r>
               <a:rPr lang="de-DE" dirty="0" smtClean="0"/>
-              <a:t>Abschließendes Interview </a:t>
-            </a:r>
-            <a:endParaRPr lang="de-DE" dirty="0" smtClean="0"/>
+              <a:t>Mitarbeiter aus verschiedenen Aufgabenbereichen </a:t>
+            </a:r>
+            <a:endParaRPr lang="de-DE" sz="1800" dirty="0"/>
+          </a:p>
+          <a:p>
+            <a:pPr indent="0"/>
+            <a:endParaRPr lang="de-DE" sz="1800" dirty="0" smtClean="0"/>
+          </a:p>
+          <a:p>
+            <a:pPr indent="0"/>
+            <a:r>
+              <a:rPr lang="de-DE" sz="1800" dirty="0" smtClean="0"/>
+              <a:t>Ergebnisse </a:t>
+            </a:r>
           </a:p>
           <a:p>
             <a:pPr marL="1028700" lvl="1">
-              <a:buFont typeface="Arial" charset="0"/>
+              <a:buFont typeface="Arial" panose="020B0604020202020204" pitchFamily="34" charset="0"/>
               <a:buChar char="•"/>
             </a:pPr>
             <a:r>
               <a:rPr lang="de-DE" dirty="0" smtClean="0"/>
-              <a:t>Mitarbeiter aus verschiedenen Aufgabenbereichen </a:t>
-            </a:r>
-            <a:endParaRPr lang="de-DE" sz="1800" dirty="0"/>
-          </a:p>
-          <a:p>
-            <a:pPr indent="0"/>
-            <a:endParaRPr lang="de-DE" sz="1800" dirty="0" smtClean="0"/>
-          </a:p>
-          <a:p>
-            <a:pPr indent="0"/>
-            <a:r>
-              <a:rPr lang="de-DE" sz="1800" dirty="0" smtClean="0"/>
-              <a:t>Ergebnisse </a:t>
-            </a:r>
-          </a:p>
-          <a:p>
-            <a:pPr marL="1028700" lvl="1">
-              <a:buFont typeface="Arial" charset="0"/>
-              <a:buChar char="•"/>
-            </a:pPr>
-            <a:r>
-              <a:rPr lang="de-DE" dirty="0" smtClean="0"/>
-              <a:t>Passwort ändern und Geräteregistrierung am häufigsten verwendet </a:t>
-            </a:r>
-          </a:p>
-          <a:p>
-            <a:pPr marL="1028700" lvl="1">
-              <a:buFont typeface="Arial" charset="0"/>
-              <a:buChar char="•"/>
-            </a:pPr>
-            <a:r>
-              <a:rPr lang="de-DE" dirty="0" smtClean="0"/>
-              <a:t>Smartphone </a:t>
-            </a:r>
-            <a:r>
-              <a:rPr lang="de-DE" dirty="0" err="1"/>
-              <a:t>S</a:t>
-            </a:r>
-            <a:r>
-              <a:rPr lang="de-DE" dirty="0" err="1" smtClean="0"/>
-              <a:t>ync</a:t>
-            </a:r>
-            <a:r>
-              <a:rPr lang="de-DE" dirty="0" smtClean="0"/>
-              <a:t>, Linux, Apple on Campus selten verwendet </a:t>
-            </a:r>
-          </a:p>
-          <a:p>
-            <a:pPr marL="1028700" lvl="1">
-              <a:buFont typeface="Arial" charset="0"/>
-              <a:buChar char="•"/>
-            </a:pPr>
+              <a:t>Auswertung läuft noch</a:t>
+            </a:r>
             <a:endParaRPr lang="de-DE" dirty="0" smtClean="0"/>
           </a:p>
           <a:p>

</xml_diff>